<commit_message>
Added stuff to ppt presentation
</commit_message>
<xml_diff>
--- a/FEUP.pptx
+++ b/FEUP.pptx
@@ -5,18 +5,20 @@
     <p:sldMasterId id="2147483648" r:id="rId1"/>
   </p:sldMasterIdLst>
   <p:notesMasterIdLst>
-    <p:notesMasterId r:id="rId6"/>
+    <p:notesMasterId r:id="rId7"/>
   </p:notesMasterIdLst>
   <p:handoutMasterIdLst>
-    <p:handoutMasterId r:id="rId7"/>
+    <p:handoutMasterId r:id="rId8"/>
   </p:handoutMasterIdLst>
   <p:sldIdLst>
-    <p:sldId id="256" r:id="rId3"/>
-    <p:sldId id="257" r:id="rId4"/>
+    <p:sldId id="256" r:id="rId2"/>
+    <p:sldId id="257" r:id="rId3"/>
+    <p:sldId id="259" r:id="rId4"/>
     <p:sldId id="258" r:id="rId5"/>
+    <p:sldId id="260" r:id="rId6"/>
   </p:sldIdLst>
   <p:sldSz cx="12192000" cy="6858000"/>
-  <p:notesSz cx="7103745" cy="10234295"/>
+  <p:notesSz cx="7104063" cy="10234613"/>
   <p:defaultTextStyle>
     <a:defPPr>
       <a:defRPr lang="zh-CN"/>
@@ -112,6 +114,22 @@
       </a:defRPr>
     </a:lvl9pPr>
   </p:defaultTextStyle>
+  <p:extLst>
+    <p:ext uri="{EFAFB233-063F-42B5-8137-9DF3F51BA10A}">
+      <p15:sldGuideLst xmlns:p15="http://schemas.microsoft.com/office/powerpoint/2012/main">
+        <p15:guide id="1" orient="horz" pos="2159">
+          <p15:clr>
+            <a:srgbClr val="A4A3A4"/>
+          </p15:clr>
+        </p15:guide>
+        <p15:guide id="2" pos="3840">
+          <p15:clr>
+            <a:srgbClr val="A4A3A4"/>
+          </p15:clr>
+        </p15:guide>
+      </p15:sldGuideLst>
+    </p:ext>
+  </p:extLst>
 </p:presentation>
 </file>
 
@@ -197,6 +215,7 @@
           <a:p>
             <a:fld id="{0F9B84EA-7D68-4D60-9CB1-D50884785D1C}" type="datetimeFigureOut">
               <a:rPr lang="zh-CN" altLang="en-US" smtClean="0"/>
+              <a:t>2020/3/14</a:t>
             </a:fld>
             <a:endParaRPr lang="zh-CN" altLang="en-US"/>
           </a:p>
@@ -262,6 +281,7 @@
           <a:p>
             <a:fld id="{8D4E0FC9-F1F8-4FAE-9988-3BA365CFD46F}" type="slidenum">
               <a:rPr lang="zh-CN" altLang="en-US" smtClean="0"/>
+              <a:t>‹#›</a:t>
             </a:fld>
             <a:endParaRPr lang="zh-CN" altLang="en-US"/>
           </a:p>
@@ -355,6 +375,7 @@
           <a:p>
             <a:fld id="{D6C8D182-E4C8-4120-9249-FC9774456FFA}" type="datetimeFigureOut">
               <a:rPr lang="zh-CN" altLang="en-US" smtClean="0"/>
+              <a:t>2020/3/14</a:t>
             </a:fld>
             <a:endParaRPr lang="zh-CN" altLang="en-US"/>
           </a:p>
@@ -421,7 +442,6 @@
               <a:rPr lang="zh-CN" altLang="en-US"/>
               <a:t>编辑母版文本样式</a:t>
             </a:r>
-            <a:endParaRPr lang="zh-CN" altLang="en-US"/>
           </a:p>
           <a:p>
             <a:pPr lvl="1"/>
@@ -429,7 +449,6 @@
               <a:rPr lang="zh-CN" altLang="en-US"/>
               <a:t>第二级</a:t>
             </a:r>
-            <a:endParaRPr lang="zh-CN" altLang="en-US"/>
           </a:p>
           <a:p>
             <a:pPr lvl="2"/>
@@ -437,7 +456,6 @@
               <a:rPr lang="zh-CN" altLang="en-US"/>
               <a:t>第三级</a:t>
             </a:r>
-            <a:endParaRPr lang="zh-CN" altLang="en-US"/>
           </a:p>
           <a:p>
             <a:pPr lvl="3"/>
@@ -445,7 +463,6 @@
               <a:rPr lang="zh-CN" altLang="en-US"/>
               <a:t>第四级</a:t>
             </a:r>
-            <a:endParaRPr lang="zh-CN" altLang="en-US"/>
           </a:p>
           <a:p>
             <a:pPr lvl="4"/>
@@ -453,7 +470,6 @@
               <a:rPr lang="zh-CN" altLang="en-US"/>
               <a:t>第五级</a:t>
             </a:r>
-            <a:endParaRPr lang="zh-CN" altLang="en-US"/>
           </a:p>
         </p:txBody>
       </p:sp>
@@ -517,6 +533,7 @@
           <a:p>
             <a:fld id="{85D0DACE-38E0-42D2-9336-2B707D34BC6D}" type="slidenum">
               <a:rPr lang="zh-CN" altLang="en-US" smtClean="0"/>
+              <a:t>‹#›</a:t>
             </a:fld>
             <a:endParaRPr lang="zh-CN" altLang="en-US"/>
           </a:p>
@@ -678,7 +695,6 @@
               <a:rPr lang="zh-CN" altLang="en-US" dirty="0"/>
               <a:t>单击此处添加标题</a:t>
             </a:r>
-            <a:endParaRPr lang="zh-CN" altLang="en-US" dirty="0"/>
           </a:p>
         </p:txBody>
       </p:sp>
@@ -699,6 +715,7 @@
           <a:p>
             <a:fld id="{760FBDFE-C587-4B4C-A407-44438C67B59E}" type="datetimeFigureOut">
               <a:rPr lang="zh-CN" altLang="en-US" smtClean="0"/>
+              <a:t>2020/3/14</a:t>
             </a:fld>
             <a:endParaRPr lang="zh-CN" altLang="en-US"/>
           </a:p>
@@ -740,6 +757,7 @@
           <a:p>
             <a:fld id="{49AE70B2-8BF9-45C0-BB95-33D1B9D3A854}" type="slidenum">
               <a:rPr lang="zh-CN" altLang="en-US" smtClean="0"/>
+              <a:t>‹#›</a:t>
             </a:fld>
             <a:endParaRPr lang="zh-CN" altLang="en-US"/>
           </a:p>
@@ -818,7 +836,6 @@
               <a:rPr lang="zh-CN" altLang="en-US" dirty="0"/>
               <a:t>单击此处添加副标题</a:t>
             </a:r>
-            <a:endParaRPr lang="zh-CN" altLang="en-US" dirty="0"/>
           </a:p>
         </p:txBody>
       </p:sp>
@@ -864,6 +881,7 @@
           <a:p>
             <a:fld id="{760FBDFE-C587-4B4C-A407-44438C67B59E}" type="datetimeFigureOut">
               <a:rPr lang="zh-CN" altLang="en-US" smtClean="0"/>
+              <a:t>2020/3/14</a:t>
             </a:fld>
             <a:endParaRPr lang="zh-CN" altLang="en-US"/>
           </a:p>
@@ -905,6 +923,7 @@
           <a:p>
             <a:fld id="{49AE70B2-8BF9-45C0-BB95-33D1B9D3A854}" type="slidenum">
               <a:rPr lang="zh-CN" altLang="en-US" smtClean="0"/>
+              <a:t>‹#›</a:t>
             </a:fld>
             <a:endParaRPr lang="zh-CN" altLang="en-US"/>
           </a:p>
@@ -935,7 +954,6 @@
               <a:rPr lang="zh-CN" altLang="en-US" dirty="0"/>
               <a:t>单击此处编辑母版文本样式</a:t>
             </a:r>
-            <a:endParaRPr lang="zh-CN" altLang="en-US" dirty="0"/>
           </a:p>
           <a:p>
             <a:pPr lvl="1"/>
@@ -943,7 +961,6 @@
               <a:rPr lang="zh-CN" altLang="en-US" dirty="0"/>
               <a:t>第二级</a:t>
             </a:r>
-            <a:endParaRPr lang="zh-CN" altLang="en-US" dirty="0"/>
           </a:p>
           <a:p>
             <a:pPr lvl="2"/>
@@ -951,7 +968,6 @@
               <a:rPr lang="zh-CN" altLang="en-US" dirty="0"/>
               <a:t>第三级</a:t>
             </a:r>
-            <a:endParaRPr lang="zh-CN" altLang="en-US" dirty="0"/>
           </a:p>
           <a:p>
             <a:pPr lvl="3"/>
@@ -959,7 +975,6 @@
               <a:rPr lang="zh-CN" altLang="en-US" dirty="0"/>
               <a:t>第四级</a:t>
             </a:r>
-            <a:endParaRPr lang="zh-CN" altLang="en-US" dirty="0"/>
           </a:p>
           <a:p>
             <a:pPr lvl="4"/>
@@ -967,7 +982,6 @@
               <a:rPr lang="zh-CN" altLang="en-US" dirty="0"/>
               <a:t>第五级</a:t>
             </a:r>
-            <a:endParaRPr lang="zh-CN" altLang="en-US" dirty="0"/>
           </a:p>
         </p:txBody>
       </p:sp>
@@ -1034,7 +1048,6 @@
               <a:rPr lang="zh-CN" altLang="en-US" dirty="0"/>
               <a:t>单击此处编辑母版标题样式</a:t>
             </a:r>
-            <a:endParaRPr lang="zh-CN" altLang="en-US" dirty="0"/>
           </a:p>
         </p:txBody>
       </p:sp>
@@ -1116,7 +1129,6 @@
               <a:rPr lang="zh-CN" altLang="en-US" dirty="0"/>
               <a:t>单击此处编辑母版文本样式</a:t>
             </a:r>
-            <a:endParaRPr lang="zh-CN" altLang="en-US" dirty="0"/>
           </a:p>
           <a:p>
             <a:pPr lvl="1"/>
@@ -1124,7 +1136,6 @@
               <a:rPr lang="zh-CN" altLang="en-US" dirty="0"/>
               <a:t>第二级</a:t>
             </a:r>
-            <a:endParaRPr lang="zh-CN" altLang="en-US" dirty="0"/>
           </a:p>
           <a:p>
             <a:pPr lvl="2"/>
@@ -1132,7 +1143,6 @@
               <a:rPr lang="zh-CN" altLang="en-US" dirty="0"/>
               <a:t>第三级</a:t>
             </a:r>
-            <a:endParaRPr lang="zh-CN" altLang="en-US" dirty="0"/>
           </a:p>
           <a:p>
             <a:pPr lvl="3"/>
@@ -1140,7 +1150,6 @@
               <a:rPr lang="zh-CN" altLang="en-US" dirty="0"/>
               <a:t>第四级</a:t>
             </a:r>
-            <a:endParaRPr lang="zh-CN" altLang="en-US" dirty="0"/>
           </a:p>
           <a:p>
             <a:pPr lvl="4"/>
@@ -1148,7 +1157,6 @@
               <a:rPr lang="zh-CN" altLang="en-US" dirty="0"/>
               <a:t>第五级</a:t>
             </a:r>
-            <a:endParaRPr lang="zh-CN" altLang="en-US" dirty="0"/>
           </a:p>
         </p:txBody>
       </p:sp>
@@ -1169,6 +1177,7 @@
           <a:p>
             <a:fld id="{760FBDFE-C587-4B4C-A407-44438C67B59E}" type="datetimeFigureOut">
               <a:rPr lang="zh-CN" altLang="en-US" smtClean="0"/>
+              <a:t>2020/3/14</a:t>
             </a:fld>
             <a:endParaRPr lang="zh-CN" altLang="en-US"/>
           </a:p>
@@ -1210,6 +1219,7 @@
           <a:p>
             <a:fld id="{49AE70B2-8BF9-45C0-BB95-33D1B9D3A854}" type="slidenum">
               <a:rPr lang="zh-CN" altLang="en-US" smtClean="0"/>
+              <a:t>‹#›</a:t>
             </a:fld>
             <a:endParaRPr lang="zh-CN" altLang="en-US"/>
           </a:p>
@@ -1278,7 +1288,6 @@
               <a:rPr lang="zh-CN" altLang="en-US" dirty="0"/>
               <a:t>单击此处编辑母版标题样式</a:t>
             </a:r>
-            <a:endParaRPr lang="zh-CN" altLang="en-US" dirty="0"/>
           </a:p>
         </p:txBody>
       </p:sp>
@@ -1398,7 +1407,6 @@
               <a:rPr lang="zh-CN" altLang="en-US" dirty="0"/>
               <a:t>单击此处编辑母版文本样式</a:t>
             </a:r>
-            <a:endParaRPr lang="zh-CN" altLang="en-US" dirty="0"/>
           </a:p>
         </p:txBody>
       </p:sp>
@@ -1419,6 +1427,7 @@
           <a:p>
             <a:fld id="{760FBDFE-C587-4B4C-A407-44438C67B59E}" type="datetimeFigureOut">
               <a:rPr lang="zh-CN" altLang="en-US" smtClean="0"/>
+              <a:t>2020/3/14</a:t>
             </a:fld>
             <a:endParaRPr lang="zh-CN" altLang="en-US"/>
           </a:p>
@@ -1460,6 +1469,7 @@
           <a:p>
             <a:fld id="{49AE70B2-8BF9-45C0-BB95-33D1B9D3A854}" type="slidenum">
               <a:rPr lang="zh-CN" altLang="en-US" smtClean="0"/>
+              <a:t>‹#›</a:t>
             </a:fld>
             <a:endParaRPr lang="zh-CN" altLang="en-US"/>
           </a:p>
@@ -1528,7 +1538,6 @@
               <a:rPr lang="zh-CN" altLang="en-US" dirty="0"/>
               <a:t>单击此处编辑母版标题样式</a:t>
             </a:r>
-            <a:endParaRPr lang="zh-CN" altLang="en-US" dirty="0"/>
           </a:p>
         </p:txBody>
       </p:sp>
@@ -1625,7 +1634,6 @@
               <a:rPr lang="zh-CN" altLang="en-US" dirty="0"/>
               <a:t>单击此处编辑母版文本样式</a:t>
             </a:r>
-            <a:endParaRPr lang="zh-CN" altLang="en-US" dirty="0"/>
           </a:p>
           <a:p>
             <a:pPr lvl="1"/>
@@ -1633,7 +1641,6 @@
               <a:rPr lang="zh-CN" altLang="en-US" dirty="0"/>
               <a:t>第二级</a:t>
             </a:r>
-            <a:endParaRPr lang="zh-CN" altLang="en-US" dirty="0"/>
           </a:p>
           <a:p>
             <a:pPr lvl="2"/>
@@ -1641,7 +1648,6 @@
               <a:rPr lang="zh-CN" altLang="en-US" dirty="0"/>
               <a:t>第三级</a:t>
             </a:r>
-            <a:endParaRPr lang="zh-CN" altLang="en-US" dirty="0"/>
           </a:p>
           <a:p>
             <a:pPr lvl="3"/>
@@ -1649,7 +1655,6 @@
               <a:rPr lang="zh-CN" altLang="en-US" dirty="0"/>
               <a:t>第四级</a:t>
             </a:r>
-            <a:endParaRPr lang="zh-CN" altLang="en-US" dirty="0"/>
           </a:p>
           <a:p>
             <a:pPr lvl="4"/>
@@ -1657,7 +1662,6 @@
               <a:rPr lang="zh-CN" altLang="en-US" dirty="0"/>
               <a:t>第五级</a:t>
             </a:r>
-            <a:endParaRPr lang="zh-CN" altLang="en-US" dirty="0"/>
           </a:p>
         </p:txBody>
       </p:sp>
@@ -1754,7 +1758,6 @@
               <a:rPr lang="zh-CN" altLang="en-US" dirty="0"/>
               <a:t>单击此处编辑母版文本样式</a:t>
             </a:r>
-            <a:endParaRPr lang="zh-CN" altLang="en-US" dirty="0"/>
           </a:p>
           <a:p>
             <a:pPr lvl="1"/>
@@ -1762,7 +1765,6 @@
               <a:rPr lang="zh-CN" altLang="en-US" dirty="0"/>
               <a:t>第二级</a:t>
             </a:r>
-            <a:endParaRPr lang="zh-CN" altLang="en-US" dirty="0"/>
           </a:p>
           <a:p>
             <a:pPr lvl="2"/>
@@ -1770,7 +1772,6 @@
               <a:rPr lang="zh-CN" altLang="en-US" dirty="0"/>
               <a:t>第三级</a:t>
             </a:r>
-            <a:endParaRPr lang="zh-CN" altLang="en-US" dirty="0"/>
           </a:p>
           <a:p>
             <a:pPr lvl="3"/>
@@ -1778,7 +1779,6 @@
               <a:rPr lang="zh-CN" altLang="en-US" dirty="0"/>
               <a:t>第四级</a:t>
             </a:r>
-            <a:endParaRPr lang="zh-CN" altLang="en-US" dirty="0"/>
           </a:p>
           <a:p>
             <a:pPr lvl="4"/>
@@ -1786,7 +1786,6 @@
               <a:rPr lang="zh-CN" altLang="en-US" dirty="0"/>
               <a:t>第五级</a:t>
             </a:r>
-            <a:endParaRPr lang="zh-CN" altLang="en-US" dirty="0"/>
           </a:p>
         </p:txBody>
       </p:sp>
@@ -1807,6 +1806,7 @@
           <a:p>
             <a:fld id="{760FBDFE-C587-4B4C-A407-44438C67B59E}" type="datetimeFigureOut">
               <a:rPr lang="zh-CN" altLang="en-US" smtClean="0"/>
+              <a:t>2020/3/14</a:t>
             </a:fld>
             <a:endParaRPr lang="zh-CN" altLang="en-US"/>
           </a:p>
@@ -1848,6 +1848,7 @@
           <a:p>
             <a:fld id="{49AE70B2-8BF9-45C0-BB95-33D1B9D3A854}" type="slidenum">
               <a:rPr lang="zh-CN" altLang="en-US" smtClean="0"/>
+              <a:t>‹#›</a:t>
             </a:fld>
             <a:endParaRPr lang="zh-CN" altLang="en-US"/>
           </a:p>
@@ -1902,7 +1903,6 @@
               <a:rPr lang="zh-CN" altLang="en-US"/>
               <a:t>单击此处编辑母版标题样式</a:t>
             </a:r>
-            <a:endParaRPr lang="zh-CN" altLang="en-US"/>
           </a:p>
         </p:txBody>
       </p:sp>
@@ -1968,7 +1968,6 @@
               <a:rPr lang="zh-CN" altLang="en-US" dirty="0"/>
               <a:t>单击此处编辑母版文本样式</a:t>
             </a:r>
-            <a:endParaRPr lang="zh-CN" altLang="en-US" dirty="0"/>
           </a:p>
         </p:txBody>
       </p:sp>
@@ -1997,7 +1996,6 @@
               <a:rPr lang="zh-CN" altLang="en-US" dirty="0"/>
               <a:t>单击此处编辑母版文本样式</a:t>
             </a:r>
-            <a:endParaRPr lang="zh-CN" altLang="en-US" dirty="0"/>
           </a:p>
           <a:p>
             <a:pPr lvl="1"/>
@@ -2005,7 +2003,6 @@
               <a:rPr lang="zh-CN" altLang="en-US" dirty="0"/>
               <a:t>第二级</a:t>
             </a:r>
-            <a:endParaRPr lang="zh-CN" altLang="en-US" dirty="0"/>
           </a:p>
           <a:p>
             <a:pPr lvl="2"/>
@@ -2013,7 +2010,6 @@
               <a:rPr lang="zh-CN" altLang="en-US" dirty="0"/>
               <a:t>第三级</a:t>
             </a:r>
-            <a:endParaRPr lang="zh-CN" altLang="en-US" dirty="0"/>
           </a:p>
           <a:p>
             <a:pPr lvl="3"/>
@@ -2021,7 +2017,6 @@
               <a:rPr lang="zh-CN" altLang="en-US" dirty="0"/>
               <a:t>第四级</a:t>
             </a:r>
-            <a:endParaRPr lang="zh-CN" altLang="en-US" dirty="0"/>
           </a:p>
           <a:p>
             <a:pPr lvl="4"/>
@@ -2029,7 +2024,6 @@
               <a:rPr lang="zh-CN" altLang="en-US" dirty="0"/>
               <a:t>第五级</a:t>
             </a:r>
-            <a:endParaRPr lang="zh-CN" altLang="en-US" dirty="0"/>
           </a:p>
         </p:txBody>
       </p:sp>
@@ -2095,7 +2089,6 @@
               <a:rPr lang="zh-CN" altLang="en-US" dirty="0"/>
               <a:t>单击此处编辑母版文本样式</a:t>
             </a:r>
-            <a:endParaRPr lang="zh-CN" altLang="en-US" dirty="0"/>
           </a:p>
         </p:txBody>
       </p:sp>
@@ -2124,7 +2117,6 @@
               <a:rPr lang="zh-CN" altLang="en-US" dirty="0"/>
               <a:t>单击此处编辑母版文本样式</a:t>
             </a:r>
-            <a:endParaRPr lang="zh-CN" altLang="en-US" dirty="0"/>
           </a:p>
           <a:p>
             <a:pPr lvl="1"/>
@@ -2132,7 +2124,6 @@
               <a:rPr lang="zh-CN" altLang="en-US" dirty="0"/>
               <a:t>第二级</a:t>
             </a:r>
-            <a:endParaRPr lang="zh-CN" altLang="en-US" dirty="0"/>
           </a:p>
           <a:p>
             <a:pPr lvl="2"/>
@@ -2140,7 +2131,6 @@
               <a:rPr lang="zh-CN" altLang="en-US" dirty="0"/>
               <a:t>第三级</a:t>
             </a:r>
-            <a:endParaRPr lang="zh-CN" altLang="en-US" dirty="0"/>
           </a:p>
           <a:p>
             <a:pPr lvl="3"/>
@@ -2148,7 +2138,6 @@
               <a:rPr lang="zh-CN" altLang="en-US" dirty="0"/>
               <a:t>第四级</a:t>
             </a:r>
-            <a:endParaRPr lang="zh-CN" altLang="en-US" dirty="0"/>
           </a:p>
           <a:p>
             <a:pPr lvl="4"/>
@@ -2156,7 +2145,6 @@
               <a:rPr lang="zh-CN" altLang="en-US" dirty="0"/>
               <a:t>第五级</a:t>
             </a:r>
-            <a:endParaRPr lang="zh-CN" altLang="en-US" dirty="0"/>
           </a:p>
         </p:txBody>
       </p:sp>
@@ -2177,6 +2165,7 @@
           <a:p>
             <a:fld id="{760FBDFE-C587-4B4C-A407-44438C67B59E}" type="datetimeFigureOut">
               <a:rPr lang="zh-CN" altLang="en-US" smtClean="0"/>
+              <a:t>2020/3/14</a:t>
             </a:fld>
             <a:endParaRPr lang="zh-CN" altLang="en-US"/>
           </a:p>
@@ -2218,6 +2207,7 @@
           <a:p>
             <a:fld id="{49AE70B2-8BF9-45C0-BB95-33D1B9D3A854}" type="slidenum">
               <a:rPr lang="zh-CN" altLang="en-US" smtClean="0"/>
+              <a:t>‹#›</a:t>
             </a:fld>
             <a:endParaRPr lang="zh-CN" altLang="en-US"/>
           </a:p>
@@ -2286,7 +2276,6 @@
               <a:rPr lang="zh-CN" altLang="en-US" dirty="0"/>
               <a:t>单击此处编辑母版标题样式</a:t>
             </a:r>
-            <a:endParaRPr lang="zh-CN" altLang="en-US" dirty="0"/>
           </a:p>
         </p:txBody>
       </p:sp>
@@ -2307,6 +2296,7 @@
           <a:p>
             <a:fld id="{760FBDFE-C587-4B4C-A407-44438C67B59E}" type="datetimeFigureOut">
               <a:rPr lang="zh-CN" altLang="en-US" smtClean="0"/>
+              <a:t>2020/3/14</a:t>
             </a:fld>
             <a:endParaRPr lang="zh-CN" altLang="en-US"/>
           </a:p>
@@ -2348,6 +2338,7 @@
           <a:p>
             <a:fld id="{49AE70B2-8BF9-45C0-BB95-33D1B9D3A854}" type="slidenum">
               <a:rPr lang="zh-CN" altLang="en-US" smtClean="0"/>
+              <a:t>‹#›</a:t>
             </a:fld>
             <a:endParaRPr lang="zh-CN" altLang="en-US"/>
           </a:p>
@@ -2395,6 +2386,7 @@
           <a:p>
             <a:fld id="{760FBDFE-C587-4B4C-A407-44438C67B59E}" type="datetimeFigureOut">
               <a:rPr lang="zh-CN" altLang="en-US" smtClean="0"/>
+              <a:t>2020/3/14</a:t>
             </a:fld>
             <a:endParaRPr lang="zh-CN" altLang="en-US"/>
           </a:p>
@@ -2436,6 +2428,7 @@
           <a:p>
             <a:fld id="{49AE70B2-8BF9-45C0-BB95-33D1B9D3A854}" type="slidenum">
               <a:rPr lang="zh-CN" altLang="en-US" smtClean="0"/>
+              <a:t>‹#›</a:t>
             </a:fld>
             <a:endParaRPr lang="zh-CN" altLang="en-US"/>
           </a:p>
@@ -2504,7 +2497,6 @@
               <a:rPr lang="zh-CN" altLang="en-US" dirty="0"/>
               <a:t>单击此处编辑标题</a:t>
             </a:r>
-            <a:endParaRPr lang="zh-CN" altLang="en-US" dirty="0"/>
           </a:p>
         </p:txBody>
       </p:sp>
@@ -2636,7 +2628,6 @@
               <a:rPr lang="zh-CN" altLang="en-US" dirty="0"/>
               <a:t>单击此处编辑母版文本样式</a:t>
             </a:r>
-            <a:endParaRPr lang="zh-CN" altLang="en-US" dirty="0"/>
           </a:p>
         </p:txBody>
       </p:sp>
@@ -2657,6 +2648,7 @@
           <a:p>
             <a:fld id="{9EFD9D74-47D9-4702-A33C-335B63B48DBF}" type="datetimeFigureOut">
               <a:rPr lang="zh-CN" altLang="en-US" smtClean="0"/>
+              <a:t>2020/3/14</a:t>
             </a:fld>
             <a:endParaRPr lang="zh-CN" altLang="en-US" dirty="0"/>
           </a:p>
@@ -2698,6 +2690,7 @@
           <a:p>
             <a:fld id="{FABC47A4-756D-490B-A52F-7D9E2C9FC05F}" type="slidenum">
               <a:rPr lang="zh-CN" altLang="en-US" smtClean="0"/>
+              <a:t>‹#›</a:t>
             </a:fld>
             <a:endParaRPr lang="zh-CN" altLang="en-US"/>
           </a:p>
@@ -2788,7 +2781,6 @@
               <a:rPr lang="zh-CN" altLang="en-US"/>
               <a:t>单击此处编辑母版标题样式</a:t>
             </a:r>
-            <a:endParaRPr lang="zh-CN" altLang="en-US"/>
           </a:p>
         </p:txBody>
       </p:sp>
@@ -2817,7 +2809,6 @@
               <a:rPr lang="zh-CN" altLang="en-US" dirty="0"/>
               <a:t>单击此处编辑母版文本样式</a:t>
             </a:r>
-            <a:endParaRPr lang="zh-CN" altLang="en-US" dirty="0"/>
           </a:p>
           <a:p>
             <a:pPr lvl="1"/>
@@ -2825,7 +2816,6 @@
               <a:rPr lang="zh-CN" altLang="en-US" dirty="0"/>
               <a:t>第二级</a:t>
             </a:r>
-            <a:endParaRPr lang="zh-CN" altLang="en-US" dirty="0"/>
           </a:p>
           <a:p>
             <a:pPr lvl="2"/>
@@ -2833,7 +2823,6 @@
               <a:rPr lang="zh-CN" altLang="en-US" dirty="0"/>
               <a:t>第三级</a:t>
             </a:r>
-            <a:endParaRPr lang="zh-CN" altLang="en-US" dirty="0"/>
           </a:p>
           <a:p>
             <a:pPr lvl="3"/>
@@ -2841,7 +2830,6 @@
               <a:rPr lang="zh-CN" altLang="en-US" dirty="0"/>
               <a:t>第四级</a:t>
             </a:r>
-            <a:endParaRPr lang="zh-CN" altLang="en-US" dirty="0"/>
           </a:p>
           <a:p>
             <a:pPr lvl="4"/>
@@ -2849,7 +2837,6 @@
               <a:rPr lang="zh-CN" altLang="en-US" dirty="0"/>
               <a:t>第五级</a:t>
             </a:r>
-            <a:endParaRPr lang="zh-CN" altLang="en-US" dirty="0"/>
           </a:p>
         </p:txBody>
       </p:sp>
@@ -2870,6 +2857,7 @@
           <a:p>
             <a:fld id="{760FBDFE-C587-4B4C-A407-44438C67B59E}" type="datetimeFigureOut">
               <a:rPr lang="zh-CN" altLang="en-US" smtClean="0"/>
+              <a:t>2020/3/14</a:t>
             </a:fld>
             <a:endParaRPr lang="zh-CN" altLang="en-US"/>
           </a:p>
@@ -2911,6 +2899,7 @@
           <a:p>
             <a:fld id="{49AE70B2-8BF9-45C0-BB95-33D1B9D3A854}" type="slidenum">
               <a:rPr lang="zh-CN" altLang="en-US" smtClean="0"/>
+              <a:t>‹#›</a:t>
             </a:fld>
             <a:endParaRPr lang="zh-CN" altLang="en-US"/>
           </a:p>
@@ -2978,7 +2967,6 @@
               <a:rPr lang="zh-CN" altLang="en-US" dirty="0"/>
               <a:t>单击此处编辑母版标题样式</a:t>
             </a:r>
-            <a:endParaRPr lang="zh-CN" altLang="en-US" dirty="0"/>
           </a:p>
         </p:txBody>
       </p:sp>
@@ -3012,7 +3000,6 @@
               <a:rPr lang="zh-CN" altLang="en-US" dirty="0"/>
               <a:t>单击此处编辑母版文本样式</a:t>
             </a:r>
-            <a:endParaRPr lang="zh-CN" altLang="en-US" dirty="0"/>
           </a:p>
           <a:p>
             <a:pPr lvl="1"/>
@@ -3020,7 +3007,6 @@
               <a:rPr lang="zh-CN" altLang="en-US" dirty="0"/>
               <a:t>第二级</a:t>
             </a:r>
-            <a:endParaRPr lang="zh-CN" altLang="en-US" dirty="0"/>
           </a:p>
           <a:p>
             <a:pPr lvl="2"/>
@@ -3028,7 +3014,6 @@
               <a:rPr lang="zh-CN" altLang="en-US" dirty="0"/>
               <a:t>第三级</a:t>
             </a:r>
-            <a:endParaRPr lang="zh-CN" altLang="en-US" dirty="0"/>
           </a:p>
           <a:p>
             <a:pPr lvl="3"/>
@@ -3036,7 +3021,6 @@
               <a:rPr lang="zh-CN" altLang="en-US" dirty="0"/>
               <a:t>第四级</a:t>
             </a:r>
-            <a:endParaRPr lang="zh-CN" altLang="en-US" dirty="0"/>
           </a:p>
           <a:p>
             <a:pPr lvl="4"/>
@@ -3044,7 +3028,6 @@
               <a:rPr lang="zh-CN" altLang="en-US" dirty="0"/>
               <a:t>第五级</a:t>
             </a:r>
-            <a:endParaRPr lang="zh-CN" altLang="en-US" dirty="0"/>
           </a:p>
         </p:txBody>
       </p:sp>
@@ -3085,6 +3068,7 @@
           <a:p>
             <a:fld id="{760FBDFE-C587-4B4C-A407-44438C67B59E}" type="datetimeFigureOut">
               <a:rPr lang="zh-CN" altLang="en-US" smtClean="0"/>
+              <a:t>2020/3/14</a:t>
             </a:fld>
             <a:endParaRPr lang="zh-CN" altLang="en-US"/>
           </a:p>
@@ -3166,6 +3150,7 @@
           <a:p>
             <a:fld id="{49AE70B2-8BF9-45C0-BB95-33D1B9D3A854}" type="slidenum">
               <a:rPr lang="zh-CN" altLang="en-US" smtClean="0"/>
+              <a:t>‹#›</a:t>
             </a:fld>
             <a:endParaRPr lang="zh-CN" altLang="en-US"/>
           </a:p>
@@ -3478,7 +3463,14 @@
         <p:cNvGrpSpPr/>
         <p:nvPr/>
       </p:nvGrpSpPr>
-      <p:grpSpPr/>
+      <p:grpSpPr>
+        <a:xfrm>
+          <a:off x="0" y="0"/>
+          <a:ext cx="0" cy="0"/>
+          <a:chOff x="0" y="0"/>
+          <a:chExt cx="0" cy="0"/>
+        </a:xfrm>
+      </p:grpSpPr>
       <p:sp>
         <p:nvSpPr>
           <p:cNvPr id="2" name="Title 1"/>
@@ -3494,19 +3486,19 @@
           <a:bodyPr>
             <a:normAutofit fontScale="90000"/>
           </a:bodyPr>
-          <a:p>
-            <a:r>
-              <a:rPr lang="en-US" altLang="en-US"/>
+          <a:lstStyle/>
+          <a:p>
+            <a:r>
+              <a:rPr lang="en-US" altLang="en-US" dirty="0"/>
               <a:t>FEUP - MIEIC</a:t>
             </a:r>
             <a:br>
-              <a:rPr lang="en-US" altLang="en-US"/>
+              <a:rPr lang="en-US" altLang="en-US" dirty="0"/>
             </a:br>
             <a:r>
-              <a:rPr lang="en-US" altLang="en-US"/>
+              <a:rPr lang="en-US" altLang="en-US" dirty="0"/>
               <a:t>IART 2019/20</a:t>
             </a:r>
-            <a:endParaRPr lang="en-US" altLang="en-US"/>
           </a:p>
         </p:txBody>
       </p:sp>
@@ -3528,33 +3520,42 @@
         </p:spPr>
         <p:txBody>
           <a:bodyPr/>
-          <a:p>
-            <a:r>
-              <a:rPr lang="en-US" altLang="en-US"/>
-              <a:t>Trabalho realizado por:</a:t>
-            </a:r>
-            <a:endParaRPr lang="en-US" altLang="en-US"/>
-          </a:p>
-          <a:p>
-            <a:r>
-              <a:rPr lang="en-US" altLang="en-US"/>
+          <a:lstStyle/>
+          <a:p>
+            <a:r>
+              <a:rPr lang="en-US" altLang="en-US" dirty="0" err="1"/>
+              <a:t>Trabalho</a:t>
+            </a:r>
+            <a:r>
+              <a:rPr lang="en-US" altLang="en-US" dirty="0"/>
+              <a:t> </a:t>
+            </a:r>
+            <a:r>
+              <a:rPr lang="en-US" altLang="en-US" dirty="0" err="1"/>
+              <a:t>realizado</a:t>
+            </a:r>
+            <a:r>
+              <a:rPr lang="en-US" altLang="en-US" dirty="0"/>
+              <a:t> por:</a:t>
+            </a:r>
+          </a:p>
+          <a:p>
+            <a:r>
+              <a:rPr lang="en-US" altLang="en-US" dirty="0"/>
               <a:t>Matheus Gonçalves (201405081)</a:t>
             </a:r>
-            <a:endParaRPr lang="en-US" altLang="en-US"/>
-          </a:p>
-          <a:p>
-            <a:r>
-              <a:rPr lang="en-US" altLang="en-US"/>
-              <a:t>Miguel Pires()</a:t>
-            </a:r>
-            <a:endParaRPr lang="en-US" altLang="en-US"/>
-          </a:p>
-          <a:p>
-            <a:r>
-              <a:rPr lang="en-US" altLang="en-US"/>
+          </a:p>
+          <a:p>
+            <a:r>
+              <a:rPr lang="en-US" altLang="en-US" dirty="0"/>
+              <a:t>Miguel Pires (201406989)</a:t>
+            </a:r>
+          </a:p>
+          <a:p>
+            <a:r>
+              <a:rPr lang="en-US" altLang="en-US" dirty="0"/>
               <a:t>Ricardo Cardoso (201604686)</a:t>
             </a:r>
-            <a:endParaRPr lang="en-US" altLang="en-US"/>
           </a:p>
         </p:txBody>
       </p:sp>
@@ -3575,7 +3576,14 @@
         <p:cNvGrpSpPr/>
         <p:nvPr/>
       </p:nvGrpSpPr>
-      <p:grpSpPr/>
+      <p:grpSpPr>
+        <a:xfrm>
+          <a:off x="0" y="0"/>
+          <a:ext cx="0" cy="0"/>
+          <a:chOff x="0" y="0"/>
+          <a:chExt cx="0" cy="0"/>
+        </a:xfrm>
+      </p:grpSpPr>
       <p:sp>
         <p:nvSpPr>
           <p:cNvPr id="2" name="Title 1"/>
@@ -3589,12 +3597,17 @@
         <p:spPr/>
         <p:txBody>
           <a:bodyPr/>
-          <a:p>
-            <a:r>
-              <a:rPr lang="en-US" altLang="en-US"/>
-              <a:t>ZHED </a:t>
-            </a:r>
-            <a:endParaRPr lang="en-US" altLang="en-US"/>
+          <a:lstStyle/>
+          <a:p>
+            <a:r>
+              <a:rPr lang="pt-BR" dirty="0"/>
+              <a:t>Especificação do </a:t>
+            </a:r>
+            <a:r>
+              <a:rPr lang="pt-PT" dirty="0"/>
+              <a:t>ZHED</a:t>
+            </a:r>
+            <a:endParaRPr lang="pt-PT" altLang="en-US" dirty="0"/>
           </a:p>
         </p:txBody>
       </p:sp>
@@ -3608,22 +3621,539 @@
             <p:ph idx="1"/>
           </p:nvPr>
         </p:nvSpPr>
-        <p:spPr/>
+        <p:spPr>
+          <a:xfrm>
+            <a:off x="647699" y="1825625"/>
+            <a:ext cx="10515601" cy="2916856"/>
+          </a:xfrm>
+        </p:spPr>
         <p:txBody>
           <a:bodyPr/>
+          <a:lstStyle/>
           <a:p>
             <a:pPr marL="0" indent="0">
               <a:buNone/>
             </a:pPr>
             <a:r>
-              <a:rPr lang="en-US" altLang="en-US"/>
-              <a:t>O zhed é um jogo do tipo solitário que consiste em </a:t>
-            </a:r>
-            <a:r>
-              <a:rPr lang="" altLang="en-US"/>
-              <a:t>resolver um puzzle.</a:t>
-            </a:r>
-            <a:endParaRPr lang="" altLang="en-US"/>
+              <a:rPr lang="en-US" altLang="en-US" dirty="0"/>
+              <a:t>	O </a:t>
+            </a:r>
+            <a:r>
+              <a:rPr lang="pt-PT" altLang="en-US" b="1" dirty="0"/>
+              <a:t>ZHED</a:t>
+            </a:r>
+            <a:r>
+              <a:rPr lang="en-US" altLang="en-US" dirty="0"/>
+              <a:t> é um </a:t>
+            </a:r>
+            <a:r>
+              <a:rPr lang="en-US" altLang="en-US" dirty="0" err="1"/>
+              <a:t>jogo</a:t>
+            </a:r>
+            <a:r>
+              <a:rPr lang="en-US" altLang="en-US" dirty="0"/>
+              <a:t> do </a:t>
+            </a:r>
+            <a:r>
+              <a:rPr lang="en-US" altLang="en-US" dirty="0" err="1"/>
+              <a:t>tipo</a:t>
+            </a:r>
+            <a:r>
+              <a:rPr lang="en-US" altLang="en-US" dirty="0"/>
+              <a:t> </a:t>
+            </a:r>
+            <a:r>
+              <a:rPr lang="en-US" altLang="en-US" dirty="0" err="1"/>
+              <a:t>solitário</a:t>
+            </a:r>
+            <a:r>
+              <a:rPr lang="en-US" altLang="en-US" dirty="0"/>
+              <a:t> que </a:t>
+            </a:r>
+            <a:r>
+              <a:rPr lang="en-US" altLang="en-US" dirty="0" err="1"/>
+              <a:t>consiste</a:t>
+            </a:r>
+            <a:r>
+              <a:rPr lang="en-US" altLang="en-US" dirty="0"/>
+              <a:t> </a:t>
+            </a:r>
+            <a:r>
+              <a:rPr lang="en-US" altLang="en-US" dirty="0" err="1"/>
+              <a:t>em</a:t>
+            </a:r>
+            <a:r>
+              <a:rPr lang="en-US" altLang="en-US" dirty="0"/>
+              <a:t> </a:t>
+            </a:r>
+            <a:r>
+              <a:rPr lang="" altLang="en-US" dirty="0"/>
+              <a:t>resolver um puzzle. </a:t>
+            </a:r>
+            <a:r>
+              <a:rPr lang="en-US" altLang="en-US" dirty="0" err="1"/>
+              <a:t>Os</a:t>
+            </a:r>
+            <a:r>
+              <a:rPr lang="en-US" altLang="en-US" dirty="0"/>
+              <a:t> puzzles  </a:t>
+            </a:r>
+            <a:r>
+              <a:rPr lang="en-US" altLang="en-US" dirty="0" err="1"/>
+              <a:t>são</a:t>
+            </a:r>
+            <a:r>
+              <a:rPr lang="en-US" altLang="en-US" dirty="0"/>
+              <a:t> </a:t>
+            </a:r>
+            <a:r>
+              <a:rPr lang="en-US" altLang="en-US" dirty="0" err="1"/>
+              <a:t>quadrículas</a:t>
+            </a:r>
+            <a:r>
+              <a:rPr lang="en-US" altLang="en-US" dirty="0"/>
+              <a:t> com casas </a:t>
+            </a:r>
+            <a:r>
+              <a:rPr lang="en-US" altLang="en-US" dirty="0" err="1"/>
+              <a:t>cinzentas</a:t>
+            </a:r>
+            <a:r>
+              <a:rPr lang="en-US" altLang="en-US" dirty="0"/>
+              <a:t>, </a:t>
+            </a:r>
+            <a:r>
+              <a:rPr lang="en-US" altLang="en-US" dirty="0" err="1"/>
+              <a:t>umas</a:t>
+            </a:r>
+            <a:r>
+              <a:rPr lang="en-US" altLang="en-US" dirty="0"/>
+              <a:t> </a:t>
+            </a:r>
+            <a:r>
+              <a:rPr lang="en-US" altLang="en-US" dirty="0" err="1"/>
+              <a:t>numeradas</a:t>
+            </a:r>
+            <a:r>
+              <a:rPr lang="en-US" altLang="en-US" dirty="0"/>
+              <a:t> e </a:t>
+            </a:r>
+            <a:r>
+              <a:rPr lang="en-US" altLang="en-US" dirty="0" err="1"/>
+              <a:t>outras</a:t>
+            </a:r>
+            <a:r>
+              <a:rPr lang="en-US" altLang="en-US" dirty="0"/>
+              <a:t> </a:t>
+            </a:r>
+            <a:r>
+              <a:rPr lang="en-US" altLang="en-US" dirty="0" err="1"/>
+              <a:t>não</a:t>
+            </a:r>
+            <a:r>
+              <a:rPr lang="en-US" altLang="en-US" dirty="0"/>
+              <a:t>, e </a:t>
+            </a:r>
+            <a:r>
+              <a:rPr lang="en-US" altLang="en-US" dirty="0" err="1"/>
+              <a:t>uma</a:t>
+            </a:r>
+            <a:r>
+              <a:rPr lang="en-US" altLang="en-US" dirty="0"/>
+              <a:t> casa </a:t>
+            </a:r>
+            <a:r>
+              <a:rPr lang="en-US" altLang="en-US" dirty="0" err="1"/>
+              <a:t>objetivo</a:t>
+            </a:r>
+            <a:r>
+              <a:rPr lang="en-US" altLang="en-US" dirty="0"/>
+              <a:t>, de </a:t>
+            </a:r>
+            <a:r>
+              <a:rPr lang="en-US" altLang="en-US" dirty="0" err="1"/>
+              <a:t>cor</a:t>
+            </a:r>
+            <a:r>
+              <a:rPr lang="en-US" altLang="en-US" dirty="0"/>
+              <a:t> </a:t>
+            </a:r>
+            <a:r>
+              <a:rPr lang="en-US" altLang="en-US" dirty="0" err="1"/>
+              <a:t>branca</a:t>
+            </a:r>
+            <a:r>
+              <a:rPr lang="en-US" altLang="en-US" dirty="0"/>
+              <a:t>. Para </a:t>
+            </a:r>
+            <a:r>
+              <a:rPr lang="en-US" altLang="en-US" dirty="0" err="1"/>
+              <a:t>completar</a:t>
+            </a:r>
+            <a:r>
+              <a:rPr lang="en-US" altLang="en-US" dirty="0"/>
+              <a:t> </a:t>
+            </a:r>
+            <a:r>
+              <a:rPr lang="en-US" altLang="en-US" dirty="0" err="1"/>
+              <a:t>cada</a:t>
+            </a:r>
+            <a:r>
+              <a:rPr lang="en-US" altLang="en-US" dirty="0"/>
+              <a:t> </a:t>
+            </a:r>
+            <a:r>
+              <a:rPr lang="en-US" altLang="en-US" dirty="0" err="1"/>
+              <a:t>nível</a:t>
+            </a:r>
+            <a:r>
+              <a:rPr lang="en-US" altLang="en-US" dirty="0"/>
+              <a:t>, </a:t>
+            </a:r>
+            <a:r>
+              <a:rPr lang="en-US" altLang="en-US" dirty="0" err="1"/>
+              <a:t>cada</a:t>
+            </a:r>
+            <a:r>
+              <a:rPr lang="en-US" altLang="en-US" dirty="0"/>
+              <a:t> casa </a:t>
+            </a:r>
+            <a:r>
+              <a:rPr lang="en-US" altLang="en-US" dirty="0" err="1"/>
+              <a:t>numerada</a:t>
+            </a:r>
+            <a:r>
+              <a:rPr lang="en-US" altLang="en-US" dirty="0"/>
+              <a:t> </a:t>
+            </a:r>
+            <a:r>
+              <a:rPr lang="en-US" altLang="en-US" dirty="0" err="1"/>
+              <a:t>tem</a:t>
+            </a:r>
+            <a:r>
+              <a:rPr lang="en-US" altLang="en-US" dirty="0"/>
+              <a:t> que ser </a:t>
+            </a:r>
+            <a:r>
+              <a:rPr lang="en-US" altLang="en-US" dirty="0" err="1"/>
+              <a:t>expandida</a:t>
+            </a:r>
+            <a:r>
+              <a:rPr lang="en-US" altLang="en-US" dirty="0"/>
+              <a:t> </a:t>
+            </a:r>
+            <a:r>
+              <a:rPr lang="en-US" altLang="en-US" dirty="0" err="1"/>
+              <a:t>em</a:t>
+            </a:r>
+            <a:r>
+              <a:rPr lang="en-US" altLang="en-US" dirty="0"/>
+              <a:t> </a:t>
+            </a:r>
+            <a:r>
+              <a:rPr lang="en-US" altLang="en-US" dirty="0" err="1"/>
+              <a:t>uma</a:t>
+            </a:r>
+            <a:r>
+              <a:rPr lang="en-US" altLang="en-US" dirty="0"/>
+              <a:t> das </a:t>
+            </a:r>
+            <a:r>
+              <a:rPr lang="en-US" altLang="en-US" dirty="0" err="1"/>
+              <a:t>quatro</a:t>
+            </a:r>
+            <a:r>
+              <a:rPr lang="en-US" altLang="en-US" dirty="0"/>
+              <a:t> </a:t>
+            </a:r>
+            <a:r>
+              <a:rPr lang="en-US" altLang="en-US" dirty="0" err="1"/>
+              <a:t>direções</a:t>
+            </a:r>
+            <a:r>
+              <a:rPr lang="en-US" altLang="en-US" dirty="0"/>
+              <a:t> (</a:t>
+            </a:r>
+            <a:r>
+              <a:rPr lang="en-US" altLang="en-US" dirty="0" err="1"/>
+              <a:t>cima</a:t>
+            </a:r>
+            <a:r>
+              <a:rPr lang="en-US" altLang="en-US" dirty="0"/>
+              <a:t>, </a:t>
+            </a:r>
+            <a:r>
+              <a:rPr lang="en-US" altLang="en-US" dirty="0" err="1"/>
+              <a:t>direita</a:t>
+            </a:r>
+            <a:r>
+              <a:rPr lang="en-US" altLang="en-US" dirty="0"/>
+              <a:t>, </a:t>
+            </a:r>
+            <a:r>
+              <a:rPr lang="en-US" altLang="en-US" dirty="0" err="1"/>
+              <a:t>baixo</a:t>
+            </a:r>
+            <a:r>
+              <a:rPr lang="en-US" altLang="en-US" dirty="0"/>
+              <a:t>, </a:t>
+            </a:r>
+            <a:r>
+              <a:rPr lang="en-US" altLang="en-US" dirty="0" err="1"/>
+              <a:t>esquerda</a:t>
+            </a:r>
+            <a:r>
+              <a:rPr lang="en-US" altLang="en-US" dirty="0"/>
+              <a:t>) e </a:t>
+            </a:r>
+            <a:r>
+              <a:rPr lang="en-US" altLang="en-US" dirty="0" err="1"/>
+              <a:t>sobreposta</a:t>
+            </a:r>
+            <a:r>
+              <a:rPr lang="en-US" altLang="en-US" dirty="0"/>
+              <a:t> para </a:t>
+            </a:r>
+            <a:r>
+              <a:rPr lang="en-US" altLang="en-US" dirty="0" err="1"/>
+              <a:t>alcançar</a:t>
+            </a:r>
+            <a:r>
+              <a:rPr lang="en-US" altLang="en-US" dirty="0"/>
+              <a:t> a casa </a:t>
+            </a:r>
+            <a:r>
+              <a:rPr lang="en-US" altLang="en-US" dirty="0" err="1"/>
+              <a:t>objetivo</a:t>
+            </a:r>
+            <a:r>
+              <a:rPr lang="en-US" altLang="en-US" dirty="0"/>
+              <a:t>.</a:t>
+            </a:r>
+          </a:p>
+          <a:p>
+            <a:pPr marL="0" indent="0">
+              <a:buNone/>
+            </a:pPr>
+            <a:endParaRPr lang="en-US" altLang="en-US" dirty="0"/>
+          </a:p>
+          <a:p>
+            <a:pPr marL="0" indent="0">
+              <a:buNone/>
+            </a:pPr>
+            <a:r>
+              <a:rPr lang="en-US" altLang="en-US" dirty="0"/>
+              <a:t>	</a:t>
+            </a:r>
+            <a:r>
+              <a:rPr lang="en-US" altLang="en-US" dirty="0" err="1"/>
+              <a:t>Cada</a:t>
+            </a:r>
+            <a:r>
+              <a:rPr lang="en-US" altLang="en-US" dirty="0"/>
+              <a:t> casa </a:t>
+            </a:r>
+            <a:r>
+              <a:rPr lang="en-US" altLang="en-US" dirty="0" err="1"/>
+              <a:t>expande</a:t>
+            </a:r>
+            <a:r>
+              <a:rPr lang="en-US" altLang="en-US" dirty="0"/>
+              <a:t> </a:t>
+            </a:r>
+            <a:r>
+              <a:rPr lang="en-US" altLang="en-US" b="1" i="1" dirty="0"/>
+              <a:t>n</a:t>
+            </a:r>
+            <a:r>
+              <a:rPr lang="en-US" altLang="en-US" dirty="0"/>
+              <a:t> casas </a:t>
+            </a:r>
+            <a:r>
+              <a:rPr lang="en-US" altLang="en-US" dirty="0" err="1"/>
+              <a:t>na</a:t>
+            </a:r>
+            <a:r>
+              <a:rPr lang="en-US" altLang="en-US" dirty="0"/>
+              <a:t> </a:t>
+            </a:r>
+            <a:r>
+              <a:rPr lang="en-US" altLang="en-US" dirty="0" err="1"/>
+              <a:t>direção</a:t>
+            </a:r>
+            <a:r>
+              <a:rPr lang="en-US" altLang="en-US" dirty="0"/>
+              <a:t> </a:t>
+            </a:r>
+            <a:r>
+              <a:rPr lang="en-US" altLang="en-US" dirty="0" err="1"/>
+              <a:t>escolhida</a:t>
+            </a:r>
+            <a:r>
+              <a:rPr lang="en-US" altLang="en-US" dirty="0"/>
+              <a:t>, </a:t>
+            </a:r>
+            <a:r>
+              <a:rPr lang="en-US" altLang="en-US" dirty="0" err="1"/>
+              <a:t>diminuindo</a:t>
+            </a:r>
+            <a:r>
+              <a:rPr lang="en-US" altLang="en-US" dirty="0"/>
+              <a:t> </a:t>
+            </a:r>
+            <a:r>
+              <a:rPr lang="en-US" altLang="en-US" dirty="0" err="1"/>
+              <a:t>em</a:t>
+            </a:r>
+            <a:r>
+              <a:rPr lang="en-US" altLang="en-US" dirty="0"/>
+              <a:t> um para </a:t>
+            </a:r>
+            <a:r>
+              <a:rPr lang="en-US" altLang="en-US" dirty="0" err="1"/>
+              <a:t>cada</a:t>
+            </a:r>
+            <a:r>
+              <a:rPr lang="en-US" altLang="en-US" dirty="0"/>
+              <a:t> casa </a:t>
+            </a:r>
+            <a:r>
+              <a:rPr lang="en-US" altLang="en-US" dirty="0" err="1"/>
+              <a:t>vazia</a:t>
+            </a:r>
+            <a:r>
+              <a:rPr lang="en-US" altLang="en-US" dirty="0"/>
+              <a:t>. </a:t>
+            </a:r>
+            <a:r>
+              <a:rPr lang="en-US" altLang="en-US" dirty="0" err="1"/>
+              <a:t>Quando</a:t>
+            </a:r>
+            <a:r>
+              <a:rPr lang="en-US" altLang="en-US" dirty="0"/>
+              <a:t> </a:t>
+            </a:r>
+            <a:r>
+              <a:rPr lang="en-US" altLang="en-US" dirty="0" err="1"/>
+              <a:t>uma</a:t>
+            </a:r>
+            <a:r>
+              <a:rPr lang="en-US" altLang="en-US" dirty="0"/>
+              <a:t> casa </a:t>
+            </a:r>
+            <a:r>
+              <a:rPr lang="en-US" altLang="en-US" dirty="0" err="1"/>
+              <a:t>em</a:t>
+            </a:r>
+            <a:r>
+              <a:rPr lang="en-US" altLang="en-US" dirty="0"/>
+              <a:t> </a:t>
+            </a:r>
+            <a:r>
+              <a:rPr lang="en-US" altLang="en-US" dirty="0" err="1"/>
+              <a:t>expansão</a:t>
+            </a:r>
+            <a:r>
+              <a:rPr lang="en-US" altLang="en-US" dirty="0"/>
+              <a:t> se </a:t>
+            </a:r>
+            <a:r>
+              <a:rPr lang="en-US" altLang="en-US" dirty="0" err="1"/>
+              <a:t>sobrepõe</a:t>
+            </a:r>
+            <a:r>
+              <a:rPr lang="en-US" altLang="en-US" dirty="0"/>
+              <a:t> a </a:t>
+            </a:r>
+            <a:r>
+              <a:rPr lang="en-US" altLang="en-US" dirty="0" err="1"/>
+              <a:t>uma</a:t>
+            </a:r>
+            <a:r>
+              <a:rPr lang="en-US" altLang="en-US" dirty="0"/>
+              <a:t> casa </a:t>
+            </a:r>
+            <a:r>
+              <a:rPr lang="en-US" altLang="en-US" dirty="0" err="1"/>
+              <a:t>já</a:t>
+            </a:r>
+            <a:r>
+              <a:rPr lang="en-US" altLang="en-US" dirty="0"/>
+              <a:t> </a:t>
+            </a:r>
+            <a:r>
+              <a:rPr lang="en-US" altLang="en-US" dirty="0" err="1"/>
+              <a:t>preenchida</a:t>
+            </a:r>
+            <a:r>
+              <a:rPr lang="en-US" altLang="en-US" dirty="0"/>
+              <a:t>, o </a:t>
+            </a:r>
+            <a:r>
+              <a:rPr lang="en-US" altLang="en-US" dirty="0" err="1"/>
+              <a:t>número</a:t>
+            </a:r>
+            <a:r>
+              <a:rPr lang="en-US" altLang="en-US" dirty="0"/>
+              <a:t> de casas a </a:t>
+            </a:r>
+            <a:r>
+              <a:rPr lang="en-US" altLang="en-US" dirty="0" err="1"/>
+              <a:t>serem</a:t>
+            </a:r>
+            <a:r>
+              <a:rPr lang="en-US" altLang="en-US" dirty="0"/>
+              <a:t> </a:t>
+            </a:r>
+            <a:r>
+              <a:rPr lang="en-US" altLang="en-US" dirty="0" err="1"/>
+              <a:t>preenchidas</a:t>
+            </a:r>
+            <a:r>
+              <a:rPr lang="en-US" altLang="en-US" dirty="0"/>
+              <a:t> </a:t>
+            </a:r>
+            <a:r>
+              <a:rPr lang="en-US" altLang="en-US" dirty="0" err="1"/>
+              <a:t>na</a:t>
+            </a:r>
+            <a:r>
+              <a:rPr lang="en-US" altLang="en-US" dirty="0"/>
+              <a:t> </a:t>
+            </a:r>
+            <a:r>
+              <a:rPr lang="en-US" altLang="en-US" dirty="0" err="1"/>
+              <a:t>direção</a:t>
+            </a:r>
+            <a:r>
+              <a:rPr lang="en-US" altLang="en-US" dirty="0"/>
+              <a:t> da </a:t>
+            </a:r>
+            <a:r>
+              <a:rPr lang="en-US" altLang="en-US" dirty="0" err="1"/>
+              <a:t>expansão</a:t>
+            </a:r>
+            <a:r>
+              <a:rPr lang="en-US" altLang="en-US" dirty="0"/>
+              <a:t> </a:t>
+            </a:r>
+            <a:r>
+              <a:rPr lang="en-US" altLang="en-US" dirty="0" err="1"/>
+              <a:t>não</a:t>
+            </a:r>
+            <a:r>
+              <a:rPr lang="en-US" altLang="en-US" dirty="0"/>
+              <a:t> </a:t>
+            </a:r>
+            <a:r>
+              <a:rPr lang="en-US" altLang="en-US" dirty="0" err="1"/>
+              <a:t>diminui</a:t>
+            </a:r>
+            <a:r>
+              <a:rPr lang="en-US" altLang="en-US" dirty="0"/>
+              <a:t>.</a:t>
+            </a:r>
+            <a:endParaRPr lang="" altLang="en-US" dirty="0"/>
           </a:p>
         </p:txBody>
       </p:sp>
@@ -3644,7 +4174,115 @@
         <p:cNvGrpSpPr/>
         <p:nvPr/>
       </p:nvGrpSpPr>
-      <p:grpSpPr/>
+      <p:grpSpPr>
+        <a:xfrm>
+          <a:off x="0" y="0"/>
+          <a:ext cx="0" cy="0"/>
+          <a:chOff x="0" y="0"/>
+          <a:chExt cx="0" cy="0"/>
+        </a:xfrm>
+      </p:grpSpPr>
+      <p:sp>
+        <p:nvSpPr>
+          <p:cNvPr id="2" name="Title 1">
+            <a:extLst>
+              <a:ext uri="{FF2B5EF4-FFF2-40B4-BE49-F238E27FC236}">
+                <a16:creationId xmlns:a16="http://schemas.microsoft.com/office/drawing/2014/main" id="{1D6EE4A9-DA7E-4976-8007-2C1722062BDF}"/>
+              </a:ext>
+            </a:extLst>
+          </p:cNvPr>
+          <p:cNvSpPr>
+            <a:spLocks noGrp="1"/>
+          </p:cNvSpPr>
+          <p:nvPr>
+            <p:ph type="title"/>
+          </p:nvPr>
+        </p:nvSpPr>
+        <p:spPr/>
+        <p:txBody>
+          <a:bodyPr/>
+          <a:lstStyle/>
+          <a:p>
+            <a:r>
+              <a:rPr lang="pt-BR" dirty="0"/>
+              <a:t>Referências</a:t>
+            </a:r>
+            <a:endParaRPr lang="en-US" dirty="0"/>
+          </a:p>
+        </p:txBody>
+      </p:sp>
+      <p:sp>
+        <p:nvSpPr>
+          <p:cNvPr id="3" name="Content Placeholder 2">
+            <a:extLst>
+              <a:ext uri="{FF2B5EF4-FFF2-40B4-BE49-F238E27FC236}">
+                <a16:creationId xmlns:a16="http://schemas.microsoft.com/office/drawing/2014/main" id="{5C02B6C4-0B81-44DB-A5AC-F3712A837560}"/>
+              </a:ext>
+            </a:extLst>
+          </p:cNvPr>
+          <p:cNvSpPr>
+            <a:spLocks noGrp="1"/>
+          </p:cNvSpPr>
+          <p:nvPr>
+            <p:ph idx="1"/>
+          </p:nvPr>
+        </p:nvSpPr>
+        <p:spPr/>
+        <p:txBody>
+          <a:bodyPr/>
+          <a:lstStyle/>
+          <a:p>
+            <a:r>
+              <a:rPr lang="pt-PT" b="1" dirty="0"/>
+              <a:t>ZHED Solver</a:t>
+            </a:r>
+            <a:r>
+              <a:rPr lang="pt-PT" dirty="0"/>
+              <a:t> - </a:t>
+            </a:r>
+            <a:r>
+              <a:rPr lang="pt-PT" dirty="0">
+                <a:hlinkClick r:id="rId2"/>
+              </a:rPr>
+              <a:t>https://www.wilgysef.com/articles/zhed-solver/#hdr-background</a:t>
+            </a:r>
+            <a:endParaRPr lang="pt-PT" dirty="0"/>
+          </a:p>
+          <a:p>
+            <a:endParaRPr lang="en-US" b="1" dirty="0"/>
+          </a:p>
+        </p:txBody>
+      </p:sp>
+    </p:spTree>
+    <p:extLst>
+      <p:ext uri="{BB962C8B-B14F-4D97-AF65-F5344CB8AC3E}">
+        <p14:creationId xmlns:p14="http://schemas.microsoft.com/office/powerpoint/2010/main" val="4261104636"/>
+      </p:ext>
+    </p:extLst>
+  </p:cSld>
+  <p:clrMapOvr>
+    <a:masterClrMapping/>
+  </p:clrMapOvr>
+</p:sld>
+</file>
+
+<file path=ppt/slides/slide4.xml><?xml version="1.0" encoding="utf-8"?>
+<p:sld xmlns:a="http://schemas.openxmlformats.org/drawingml/2006/main" xmlns:r="http://schemas.openxmlformats.org/officeDocument/2006/relationships" xmlns:p="http://schemas.openxmlformats.org/presentationml/2006/main">
+  <p:cSld>
+    <p:spTree>
+      <p:nvGrpSpPr>
+        <p:cNvPr id="1" name=""/>
+        <p:cNvGrpSpPr/>
+        <p:nvPr/>
+      </p:nvGrpSpPr>
+      <p:grpSpPr>
+        <a:xfrm>
+          <a:off x="0" y="0"/>
+          <a:ext cx="0" cy="0"/>
+          <a:chOff x="0" y="0"/>
+          <a:chExt cx="0" cy="0"/>
+        </a:xfrm>
+      </p:grpSpPr>
       <p:sp>
         <p:nvSpPr>
           <p:cNvPr id="2" name="Title 1"/>
@@ -3663,12 +4301,12 @@
         </p:spPr>
         <p:txBody>
           <a:bodyPr/>
+          <a:lstStyle/>
           <a:p>
             <a:r>
               <a:rPr lang="" altLang="en-US"/>
               <a:t>Problema de pesquisa</a:t>
             </a:r>
-            <a:endParaRPr lang="" altLang="en-US"/>
           </a:p>
         </p:txBody>
       </p:sp>
@@ -3704,6 +4342,7 @@
         </p:style>
         <p:txBody>
           <a:bodyPr/>
+          <a:lstStyle/>
           <a:p>
             <a:r>
               <a:rPr lang="" altLang="en-US" u="sng"/>
@@ -3719,7 +4358,6 @@
               <a:rPr lang="" altLang="en-US"/>
               <a:t>ArrayList&lt;ArrayList&lt;char&gt;&gt;</a:t>
             </a:r>
-            <a:endParaRPr lang="" altLang="en-US"/>
           </a:p>
           <a:p>
             <a:pPr marL="0" indent="0">
@@ -3729,7 +4367,6 @@
               <a:rPr lang="" altLang="en-US"/>
               <a:t>    .    =&gt; espaço em branco</a:t>
             </a:r>
-            <a:endParaRPr lang="" altLang="en-US"/>
           </a:p>
           <a:p>
             <a:pPr marL="0" indent="0">
@@ -3739,7 +4376,6 @@
               <a:rPr lang="" altLang="en-US"/>
               <a:t>[1..9] =&gt; casas selecionáveis</a:t>
             </a:r>
-            <a:endParaRPr lang="" altLang="en-US"/>
           </a:p>
           <a:p>
             <a:pPr marL="0" indent="0">
@@ -3749,7 +4385,6 @@
               <a:rPr lang="" altLang="en-US"/>
               <a:t>   W  =&gt; casa vencedora</a:t>
             </a:r>
-            <a:endParaRPr lang="" altLang="en-US"/>
           </a:p>
           <a:p>
             <a:pPr marL="0" indent="0">
@@ -3765,9 +4400,6 @@
               </a:rPr>
               <a:t>●    =&gt; espaço ocupado/preto</a:t>
             </a:r>
-            <a:endParaRPr lang="" altLang="en-US">
-              <a:latin typeface="东文宋体" charset="0"/>
-            </a:endParaRPr>
           </a:p>
         </p:txBody>
       </p:sp>
@@ -4006,10 +4638,6 @@
               </a:rPr>
               <a:t> . . . . . 3 . .</a:t>
             </a:r>
-            <a:endParaRPr lang="" altLang="en-US">
-              <a:latin typeface="FreeMono" panose="020F0409020205020404" charset="0"/>
-              <a:cs typeface="FreeMono" panose="020F0409020205020404" charset="0"/>
-            </a:endParaRPr>
           </a:p>
           <a:p>
             <a:pPr marL="0" indent="0">
@@ -4025,10 +4653,6 @@
               </a:rPr>
               <a:t> . 4 . . . . . .</a:t>
             </a:r>
-            <a:endParaRPr lang="" altLang="en-US">
-              <a:latin typeface="FreeMono" panose="020F0409020205020404" charset="0"/>
-              <a:cs typeface="FreeMono" panose="020F0409020205020404" charset="0"/>
-            </a:endParaRPr>
           </a:p>
           <a:p>
             <a:pPr marL="0" indent="0">
@@ -4559,10 +5183,6 @@
               </a:rPr>
               <a:t>? ? ? ? ? ? ? ?</a:t>
             </a:r>
-            <a:endParaRPr lang="">
-              <a:latin typeface="FreeMono" panose="020F0409020205020404" charset="0"/>
-              <a:cs typeface="FreeMono" panose="020F0409020205020404" charset="0"/>
-            </a:endParaRPr>
           </a:p>
           <a:p>
             <a:pPr marL="0" indent="0">
@@ -4709,11 +5329,6 @@
               </a:rPr>
               <a:t>? ? ? ? ? ? ? ?</a:t>
             </a:r>
-            <a:endParaRPr lang="en-US">
-              <a:latin typeface="FreeMono" panose="020F0409020205020404" charset="0"/>
-              <a:cs typeface="FreeMono" panose="020F0409020205020404" charset="0"/>
-              <a:sym typeface="+mn-ea"/>
-            </a:endParaRPr>
           </a:p>
           <a:p>
             <a:pPr marL="0" indent="0">
@@ -4730,11 +5345,6 @@
               </a:rPr>
               <a:t> ? ? ? ? ? ? ? ?</a:t>
             </a:r>
-            <a:endParaRPr lang="en-US">
-              <a:latin typeface="FreeMono" panose="020F0409020205020404" charset="0"/>
-              <a:cs typeface="FreeMono" panose="020F0409020205020404" charset="0"/>
-              <a:sym typeface="+mn-ea"/>
-            </a:endParaRPr>
           </a:p>
           <a:p>
             <a:pPr marL="0" indent="0">
@@ -4991,9 +5601,6 @@
               </a:rPr>
               <a:t> </a:t>
             </a:r>
-            <a:endParaRPr lang="en-US" altLang="en-US">
-              <a:latin typeface="东文宋体" charset="0"/>
-            </a:endParaRPr>
           </a:p>
           <a:p>
             <a:pPr marL="0" indent="0">
@@ -5005,9 +5612,6 @@
               </a:rPr>
               <a:t>  </a:t>
             </a:r>
-            <a:endParaRPr lang="en-US" altLang="en-US">
-              <a:latin typeface="东文宋体" charset="0"/>
-            </a:endParaRPr>
           </a:p>
         </p:txBody>
       </p:sp>
@@ -5227,9 +5831,6 @@
               </a:rPr>
               <a:t>Esquerda, Direita, Cima, Baixo. </a:t>
             </a:r>
-            <a:endParaRPr lang="en-US" altLang="en-US">
-              <a:latin typeface="东文宋体" charset="0"/>
-            </a:endParaRPr>
           </a:p>
           <a:p>
             <a:pPr marL="0" indent="0">
@@ -5241,9 +5842,6 @@
               </a:rPr>
               <a:t>  </a:t>
             </a:r>
-            <a:endParaRPr lang="en-US" altLang="en-US">
-              <a:latin typeface="东文宋体" charset="0"/>
-            </a:endParaRPr>
           </a:p>
         </p:txBody>
       </p:sp>
@@ -5253,6 +5851,90 @@
     <a:masterClrMapping/>
   </p:clrMapOvr>
   <p:transition/>
+</p:sld>
+</file>
+
+<file path=ppt/slides/slide5.xml><?xml version="1.0" encoding="utf-8"?>
+<p:sld xmlns:a="http://schemas.openxmlformats.org/drawingml/2006/main" xmlns:r="http://schemas.openxmlformats.org/officeDocument/2006/relationships" xmlns:p="http://schemas.openxmlformats.org/presentationml/2006/main">
+  <p:cSld>
+    <p:spTree>
+      <p:nvGrpSpPr>
+        <p:cNvPr id="1" name=""/>
+        <p:cNvGrpSpPr/>
+        <p:nvPr/>
+      </p:nvGrpSpPr>
+      <p:grpSpPr>
+        <a:xfrm>
+          <a:off x="0" y="0"/>
+          <a:ext cx="0" cy="0"/>
+          <a:chOff x="0" y="0"/>
+          <a:chExt cx="0" cy="0"/>
+        </a:xfrm>
+      </p:grpSpPr>
+      <p:sp>
+        <p:nvSpPr>
+          <p:cNvPr id="2" name="Title 1">
+            <a:extLst>
+              <a:ext uri="{FF2B5EF4-FFF2-40B4-BE49-F238E27FC236}">
+                <a16:creationId xmlns:a16="http://schemas.microsoft.com/office/drawing/2014/main" id="{3D5F77CA-9785-40A8-823D-9E9F6892B96F}"/>
+              </a:ext>
+            </a:extLst>
+          </p:cNvPr>
+          <p:cNvSpPr>
+            <a:spLocks noGrp="1"/>
+          </p:cNvSpPr>
+          <p:nvPr>
+            <p:ph type="title"/>
+          </p:nvPr>
+        </p:nvSpPr>
+        <p:spPr/>
+        <p:txBody>
+          <a:bodyPr/>
+          <a:lstStyle/>
+          <a:p>
+            <a:r>
+              <a:rPr lang="pt-PT" dirty="0"/>
+              <a:t>Implementação realizada</a:t>
+            </a:r>
+            <a:endParaRPr lang="en-US" dirty="0"/>
+          </a:p>
+        </p:txBody>
+      </p:sp>
+      <p:sp>
+        <p:nvSpPr>
+          <p:cNvPr id="3" name="Content Placeholder 2">
+            <a:extLst>
+              <a:ext uri="{FF2B5EF4-FFF2-40B4-BE49-F238E27FC236}">
+                <a16:creationId xmlns:a16="http://schemas.microsoft.com/office/drawing/2014/main" id="{534C6CC2-E5B7-48BE-A8F2-7087844DDDDF}"/>
+              </a:ext>
+            </a:extLst>
+          </p:cNvPr>
+          <p:cNvSpPr>
+            <a:spLocks noGrp="1"/>
+          </p:cNvSpPr>
+          <p:nvPr>
+            <p:ph idx="1"/>
+          </p:nvPr>
+        </p:nvSpPr>
+        <p:spPr/>
+        <p:txBody>
+          <a:bodyPr/>
+          <a:lstStyle/>
+          <a:p>
+            <a:endParaRPr lang="en-US"/>
+          </a:p>
+        </p:txBody>
+      </p:sp>
+    </p:spTree>
+    <p:extLst>
+      <p:ext uri="{BB962C8B-B14F-4D97-AF65-F5344CB8AC3E}">
+        <p14:creationId xmlns:p14="http://schemas.microsoft.com/office/powerpoint/2010/main" val="660863884"/>
+      </p:ext>
+    </p:extLst>
+  </p:cSld>
+  <p:clrMapOvr>
+    <a:masterClrMapping/>
+  </p:clrMapOvr>
 </p:sld>
 </file>
 
@@ -5507,6 +6189,8 @@
       </a:bgFillStyleLst>
     </a:fmtScheme>
   </a:themeElements>
+  <a:objectDefaults/>
+  <a:extraClrSchemeLst/>
   <a:extLst>
     <a:ext uri="{05A4C25C-085E-4340-85A3-A5531E510DB2}">
       <thm15:themeFamily xmlns:thm15="http://schemas.microsoft.com/office/thememl/2012/main" name="Office Theme" id="{62F939B6-93AF-4DB8-9C6B-D6C7DFDC589F}" vid="{4A3C46E8-61CC-4603-A589-7422A47A8E4A}"/>
@@ -5766,6 +6450,8 @@
       </a:bgFillStyleLst>
     </a:fmtScheme>
   </a:themeElements>
+  <a:objectDefaults/>
+  <a:extraClrSchemeLst/>
   <a:extLst>
     <a:ext uri="{05A4C25C-085E-4340-85A3-A5531E510DB2}">
       <thm15:themeFamily xmlns:thm15="http://schemas.microsoft.com/office/thememl/2012/main" name="Office Theme" id="{62F939B6-93AF-4DB8-9C6B-D6C7DFDC589F}" vid="{4A3C46E8-61CC-4603-A589-7422A47A8E4A}"/>
@@ -6025,6 +6711,8 @@
       </a:bgFillStyleLst>
     </a:fmtScheme>
   </a:themeElements>
+  <a:objectDefaults/>
+  <a:extraClrSchemeLst/>
   <a:extLst>
     <a:ext uri="{05A4C25C-085E-4340-85A3-A5531E510DB2}">
       <thm15:themeFamily xmlns:thm15="http://schemas.microsoft.com/office/thememl/2012/main" name="Office Theme" id="{62F939B6-93AF-4DB8-9C6B-D6C7DFDC589F}" vid="{4A3C46E8-61CC-4603-A589-7422A47A8E4A}"/>

</xml_diff>

<commit_message>
minor changes to report
</commit_message>
<xml_diff>
--- a/FEUP.pptx
+++ b/FEUP.pptx
@@ -116,6 +116,11 @@
       </a:defRPr>
     </a:lvl9pPr>
   </p:defaultTextStyle>
+  <p:extLst>
+    <p:ext uri="{EFAFB233-063F-42B5-8137-9DF3F51BA10A}">
+      <p15:sldGuideLst xmlns:p15="http://schemas.microsoft.com/office/powerpoint/2012/main"/>
+    </p:ext>
+  </p:extLst>
 </p:presentation>
 </file>
 
@@ -201,7 +206,7 @@
           <a:p>
             <a:fld id="{CD52A834-5F0C-4356-9985-5DF774D3196F}" type="datetimeFigureOut">
               <a:rPr lang="en-US" smtClean="0"/>
-              <a:t>3/28/2020</a:t>
+              <a:t>3/29/2020</a:t>
             </a:fld>
             <a:endParaRPr lang="en-US"/>
           </a:p>
@@ -6197,8 +6202,8 @@
         </p:nvSpPr>
         <p:spPr>
           <a:xfrm>
-            <a:off x="647640" y="1825560"/>
-            <a:ext cx="10514880" cy="2916000"/>
+            <a:off x="647640" y="1825559"/>
+            <a:ext cx="10514880" cy="4122479"/>
           </a:xfrm>
           <a:prstGeom prst="rect">
             <a:avLst/>
@@ -6239,11 +6244,107 @@
                 </a:solidFill>
                 <a:latin typeface="Arial"/>
               </a:rPr>
-              <a:t>	…</a:t>
-            </a:r>
-            <a:endParaRPr lang="pt-PT" sz="2000" b="0" strike="noStrike" spc="-1" dirty="0">
-              <a:latin typeface="Arial"/>
-            </a:endParaRPr>
+              <a:t>	Os nossos operadores são as 4 direções das peças (cim</a:t>
+            </a:r>
+            <a:r>
+              <a:rPr lang="pt-PT" sz="2000" spc="-1" dirty="0">
+                <a:solidFill>
+                  <a:srgbClr val="404040"/>
+                </a:solidFill>
+                <a:latin typeface="Arial"/>
+              </a:rPr>
+              <a:t>a, direita, baixo, esquerda).</a:t>
+            </a:r>
+          </a:p>
+          <a:p>
+            <a:pPr>
+              <a:lnSpc>
+                <a:spcPct val="90000"/>
+              </a:lnSpc>
+              <a:spcBef>
+                <a:spcPts val="1001"/>
+              </a:spcBef>
+            </a:pPr>
+            <a:r>
+              <a:rPr lang="pt-PT" sz="2000" b="0" strike="noStrike" spc="-1" dirty="0">
+                <a:solidFill>
+                  <a:srgbClr val="404040"/>
+                </a:solidFill>
+                <a:latin typeface="Arial"/>
+              </a:rPr>
+              <a:t>	</a:t>
+            </a:r>
+          </a:p>
+          <a:p>
+            <a:pPr>
+              <a:lnSpc>
+                <a:spcPct val="90000"/>
+              </a:lnSpc>
+              <a:spcBef>
+                <a:spcPts val="1001"/>
+              </a:spcBef>
+            </a:pPr>
+            <a:endParaRPr lang="pt-PT" sz="2000" spc="-1" dirty="0">
+              <a:solidFill>
+                <a:srgbClr val="404040"/>
+              </a:solidFill>
+              <a:latin typeface="Arial"/>
+            </a:endParaRPr>
+          </a:p>
+          <a:p>
+            <a:pPr>
+              <a:lnSpc>
+                <a:spcPct val="90000"/>
+              </a:lnSpc>
+              <a:spcBef>
+                <a:spcPts val="1001"/>
+              </a:spcBef>
+            </a:pPr>
+            <a:r>
+              <a:rPr lang="pt-PT" sz="2000" b="0" strike="noStrike" spc="-1" dirty="0">
+                <a:solidFill>
+                  <a:srgbClr val="404040"/>
+                </a:solidFill>
+                <a:latin typeface="Arial"/>
+              </a:rPr>
+              <a:t>	Heurísticas/ funções </a:t>
+            </a:r>
+            <a:r>
+              <a:rPr lang="pt-PT" sz="2000" spc="-1" dirty="0">
+                <a:solidFill>
+                  <a:srgbClr val="404040"/>
+                </a:solidFill>
+                <a:latin typeface="Arial"/>
+              </a:rPr>
+              <a:t>de avaliação </a:t>
+            </a:r>
+            <a:r>
+              <a:rPr lang="pt-PT" sz="2000" b="0" strike="noStrike" spc="-1" dirty="0">
+                <a:solidFill>
+                  <a:srgbClr val="404040"/>
+                </a:solidFill>
+                <a:latin typeface="Arial"/>
+              </a:rPr>
+              <a:t>por definir no </a:t>
+            </a:r>
+            <a:r>
+              <a:rPr lang="pt-PT" sz="2000" b="0" strike="noStrike" spc="-1" dirty="0" err="1">
+                <a:solidFill>
+                  <a:srgbClr val="404040"/>
+                </a:solidFill>
+                <a:latin typeface="Arial"/>
+              </a:rPr>
+              <a:t>Greedy</a:t>
+            </a:r>
+            <a:r>
+              <a:rPr lang="pt-PT" sz="2000" b="0" strike="noStrike" spc="-1" dirty="0">
+                <a:solidFill>
+                  <a:srgbClr val="404040"/>
+                </a:solidFill>
+                <a:latin typeface="Arial"/>
+              </a:rPr>
+              <a:t> e no A*.</a:t>
+            </a:r>
           </a:p>
         </p:txBody>
       </p:sp>
@@ -7428,6 +7529,70 @@
           </a:p>
         </p:txBody>
       </p:sp>
+      <p:sp>
+        <p:nvSpPr>
+          <p:cNvPr id="5" name="CustomShape 2">
+            <a:extLst>
+              <a:ext uri="{FF2B5EF4-FFF2-40B4-BE49-F238E27FC236}">
+                <a16:creationId xmlns:a16="http://schemas.microsoft.com/office/drawing/2014/main" id="{490D96AA-CF43-492C-B97D-5556CE1C83C4}"/>
+              </a:ext>
+            </a:extLst>
+          </p:cNvPr>
+          <p:cNvSpPr/>
+          <p:nvPr/>
+        </p:nvSpPr>
+        <p:spPr>
+          <a:xfrm>
+            <a:off x="647640" y="1825560"/>
+            <a:ext cx="10514880" cy="4468708"/>
+          </a:xfrm>
+          <a:prstGeom prst="rect">
+            <a:avLst/>
+          </a:prstGeom>
+          <a:noFill/>
+          <a:ln>
+            <a:noFill/>
+          </a:ln>
+        </p:spPr>
+        <p:style>
+          <a:lnRef idx="0">
+            <a:scrgbClr r="0" g="0" b="0"/>
+          </a:lnRef>
+          <a:fillRef idx="0">
+            <a:scrgbClr r="0" g="0" b="0"/>
+          </a:fillRef>
+          <a:effectRef idx="0">
+            <a:scrgbClr r="0" g="0" b="0"/>
+          </a:effectRef>
+          <a:fontRef idx="minor"/>
+        </p:style>
+        <p:txBody>
+          <a:bodyPr lIns="90000" tIns="45000" rIns="90000" bIns="45000"/>
+          <a:lstStyle/>
+          <a:p>
+            <a:pPr>
+              <a:lnSpc>
+                <a:spcPct val="90000"/>
+              </a:lnSpc>
+              <a:spcBef>
+                <a:spcPts val="1001"/>
+              </a:spcBef>
+            </a:pPr>
+            <a:r>
+              <a:rPr lang="pt-PT" sz="2000" b="0" strike="noStrike" spc="-1" dirty="0">
+                <a:latin typeface="Arial"/>
+              </a:rPr>
+              <a:t>Tabel</a:t>
+            </a:r>
+            <a:r>
+              <a:rPr lang="pt-PT" sz="2000" spc="-1" dirty="0">
+                <a:latin typeface="Arial"/>
+              </a:rPr>
+              <a:t>a relacionando o tempo com nº de peças</a:t>
+            </a:r>
+          </a:p>
+        </p:txBody>
+      </p:sp>
     </p:spTree>
     <p:extLst>
       <p:ext uri="{BB962C8B-B14F-4D97-AF65-F5344CB8AC3E}">
@@ -7587,8 +7752,17 @@
               <a:rPr lang="pt-PT" sz="2000" b="0" strike="noStrike" spc="-1" dirty="0">
                 <a:latin typeface="Arial"/>
               </a:rPr>
-              <a:t>	Neste trabalhos podemos concluir… </a:t>
-            </a:r>
+              <a:t>	Conclusões que retiramos com a aplicação de cada algoritmo nos níveis do jogo, relação que eles têm com o tempo de execução e o nº </a:t>
+            </a:r>
+            <a:r>
+              <a:rPr lang="pt-PT" sz="2000" b="0" strike="noStrike" spc="-1">
+                <a:latin typeface="Arial"/>
+              </a:rPr>
+              <a:t>de peças.</a:t>
+            </a:r>
+            <a:endParaRPr lang="pt-PT" sz="2000" b="0" strike="noStrike" spc="-1" dirty="0">
+              <a:latin typeface="Arial"/>
+            </a:endParaRPr>
           </a:p>
         </p:txBody>
       </p:sp>
@@ -8145,6 +8319,54 @@
               </a:rPr>
               <a:t>Repositório no GitHub</a:t>
             </a:r>
+          </a:p>
+          <a:p>
+            <a:pPr marL="228600" indent="-227880">
+              <a:lnSpc>
+                <a:spcPct val="90000"/>
+              </a:lnSpc>
+              <a:spcBef>
+                <a:spcPts val="1001"/>
+              </a:spcBef>
+              <a:buClr>
+                <a:srgbClr val="404040"/>
+              </a:buClr>
+              <a:buFont typeface="Arial"/>
+              <a:buChar char="•"/>
+            </a:pPr>
+            <a:r>
+              <a:rPr lang="pt-PT" sz="2000" spc="-1" dirty="0" err="1">
+                <a:latin typeface="Arial"/>
+              </a:rPr>
+              <a:t>Gradle</a:t>
+            </a:r>
+            <a:r>
+              <a:rPr lang="pt-PT" sz="2000" spc="-1" dirty="0">
+                <a:latin typeface="Arial"/>
+              </a:rPr>
+              <a:t> </a:t>
+            </a:r>
+            <a:r>
+              <a:rPr lang="pt-PT" sz="2000" spc="-1" dirty="0" err="1">
+                <a:latin typeface="Arial"/>
+              </a:rPr>
+              <a:t>Build</a:t>
+            </a:r>
+            <a:r>
+              <a:rPr lang="pt-PT" sz="2000" spc="-1" dirty="0">
+                <a:latin typeface="Arial"/>
+              </a:rPr>
+              <a:t> </a:t>
+            </a:r>
+            <a:r>
+              <a:rPr lang="pt-PT" sz="2000" spc="-1" dirty="0" err="1">
+                <a:latin typeface="Arial"/>
+              </a:rPr>
+              <a:t>Tool</a:t>
+            </a:r>
+            <a:endParaRPr lang="pt-PT" sz="2000" b="0" strike="noStrike" spc="-1" dirty="0">
+              <a:latin typeface="Arial"/>
+            </a:endParaRPr>
           </a:p>
         </p:txBody>
       </p:sp>

</xml_diff>